<commit_message>
editted the web portal ppt file to include progress at phase 1 and project plan at phase 2
</commit_message>
<xml_diff>
--- a/docs/Web portal.pptx
+++ b/docs/Web portal.pptx
@@ -214,7 +214,7 @@
           <a:p>
             <a:fld id="{577E70E5-F9A2-4353-BB56-7C6C16CEBAC2}" type="datetimeFigureOut">
               <a:rPr lang="en-US" smtClean="0"/>
-              <a:t>10/2/2018</a:t>
+              <a:t>10/4/2018</a:t>
             </a:fld>
             <a:endParaRPr lang="en-US"/>
           </a:p>
@@ -1329,7 +1329,7 @@
           <a:p>
             <a:fld id="{411E36CB-AE7C-4D81-8BA1-98AEF09D6E79}" type="datetimeFigureOut">
               <a:rPr lang="en-US" smtClean="0"/>
-              <a:t>10/2/2018</a:t>
+              <a:t>10/4/2018</a:t>
             </a:fld>
             <a:endParaRPr lang="en-US"/>
           </a:p>
@@ -1499,7 +1499,7 @@
           <a:p>
             <a:fld id="{411E36CB-AE7C-4D81-8BA1-98AEF09D6E79}" type="datetimeFigureOut">
               <a:rPr lang="en-US" smtClean="0"/>
-              <a:t>10/2/2018</a:t>
+              <a:t>10/4/2018</a:t>
             </a:fld>
             <a:endParaRPr lang="en-US"/>
           </a:p>
@@ -1679,7 +1679,7 @@
           <a:p>
             <a:fld id="{411E36CB-AE7C-4D81-8BA1-98AEF09D6E79}" type="datetimeFigureOut">
               <a:rPr lang="en-US" smtClean="0"/>
-              <a:t>10/2/2018</a:t>
+              <a:t>10/4/2018</a:t>
             </a:fld>
             <a:endParaRPr lang="en-US"/>
           </a:p>
@@ -1849,7 +1849,7 @@
           <a:p>
             <a:fld id="{411E36CB-AE7C-4D81-8BA1-98AEF09D6E79}" type="datetimeFigureOut">
               <a:rPr lang="en-US" smtClean="0"/>
-              <a:t>10/2/2018</a:t>
+              <a:t>10/4/2018</a:t>
             </a:fld>
             <a:endParaRPr lang="en-US"/>
           </a:p>
@@ -2095,7 +2095,7 @@
           <a:p>
             <a:fld id="{411E36CB-AE7C-4D81-8BA1-98AEF09D6E79}" type="datetimeFigureOut">
               <a:rPr lang="en-US" smtClean="0"/>
-              <a:t>10/2/2018</a:t>
+              <a:t>10/4/2018</a:t>
             </a:fld>
             <a:endParaRPr lang="en-US"/>
           </a:p>
@@ -2327,7 +2327,7 @@
           <a:p>
             <a:fld id="{411E36CB-AE7C-4D81-8BA1-98AEF09D6E79}" type="datetimeFigureOut">
               <a:rPr lang="en-US" smtClean="0"/>
-              <a:t>10/2/2018</a:t>
+              <a:t>10/4/2018</a:t>
             </a:fld>
             <a:endParaRPr lang="en-US"/>
           </a:p>
@@ -2694,7 +2694,7 @@
           <a:p>
             <a:fld id="{411E36CB-AE7C-4D81-8BA1-98AEF09D6E79}" type="datetimeFigureOut">
               <a:rPr lang="en-US" smtClean="0"/>
-              <a:t>10/2/2018</a:t>
+              <a:t>10/4/2018</a:t>
             </a:fld>
             <a:endParaRPr lang="en-US"/>
           </a:p>
@@ -2812,7 +2812,7 @@
           <a:p>
             <a:fld id="{411E36CB-AE7C-4D81-8BA1-98AEF09D6E79}" type="datetimeFigureOut">
               <a:rPr lang="en-US" smtClean="0"/>
-              <a:t>10/2/2018</a:t>
+              <a:t>10/4/2018</a:t>
             </a:fld>
             <a:endParaRPr lang="en-US"/>
           </a:p>
@@ -2907,7 +2907,7 @@
           <a:p>
             <a:fld id="{411E36CB-AE7C-4D81-8BA1-98AEF09D6E79}" type="datetimeFigureOut">
               <a:rPr lang="en-US" smtClean="0"/>
-              <a:t>10/2/2018</a:t>
+              <a:t>10/4/2018</a:t>
             </a:fld>
             <a:endParaRPr lang="en-US"/>
           </a:p>
@@ -3184,7 +3184,7 @@
           <a:p>
             <a:fld id="{411E36CB-AE7C-4D81-8BA1-98AEF09D6E79}" type="datetimeFigureOut">
               <a:rPr lang="en-US" smtClean="0"/>
-              <a:t>10/2/2018</a:t>
+              <a:t>10/4/2018</a:t>
             </a:fld>
             <a:endParaRPr lang="en-US"/>
           </a:p>
@@ -3437,7 +3437,7 @@
           <a:p>
             <a:fld id="{411E36CB-AE7C-4D81-8BA1-98AEF09D6E79}" type="datetimeFigureOut">
               <a:rPr lang="en-US" smtClean="0"/>
-              <a:t>10/2/2018</a:t>
+              <a:t>10/4/2018</a:t>
             </a:fld>
             <a:endParaRPr lang="en-US"/>
           </a:p>
@@ -3650,7 +3650,7 @@
           <a:p>
             <a:fld id="{411E36CB-AE7C-4D81-8BA1-98AEF09D6E79}" type="datetimeFigureOut">
               <a:rPr lang="en-US" smtClean="0"/>
-              <a:t>10/2/2018</a:t>
+              <a:t>10/4/2018</a:t>
             </a:fld>
             <a:endParaRPr lang="en-US"/>
           </a:p>
@@ -4698,11 +4698,11 @@
   <p:clrMapOvr>
     <a:masterClrMapping/>
   </p:clrMapOvr>
-  <mc:AlternateContent xmlns:mc="http://schemas.openxmlformats.org/markup-compatibility/2006">
-    <mc:Choice xmlns:p14="http://schemas.microsoft.com/office/powerpoint/2010/main" Requires="p14">
+  <mc:AlternateContent xmlns:mc="http://schemas.openxmlformats.org/markup-compatibility/2006" xmlns:p14="http://schemas.microsoft.com/office/powerpoint/2010/main">
+    <mc:Choice Requires="p14">
       <p:transition spd="slow" p14:dur="2000"/>
     </mc:Choice>
-    <mc:Fallback>
+    <mc:Fallback xmlns="">
       <p:transition spd="slow"/>
     </mc:Fallback>
   </mc:AlternateContent>
@@ -4854,11 +4854,11 @@
   <p:clrMapOvr>
     <a:masterClrMapping/>
   </p:clrMapOvr>
-  <mc:AlternateContent xmlns:mc="http://schemas.openxmlformats.org/markup-compatibility/2006">
-    <mc:Choice xmlns:p14="http://schemas.microsoft.com/office/powerpoint/2010/main" Requires="p14">
+  <mc:AlternateContent xmlns:mc="http://schemas.openxmlformats.org/markup-compatibility/2006" xmlns:p14="http://schemas.microsoft.com/office/powerpoint/2010/main">
+    <mc:Choice Requires="p14">
       <p:transition spd="slow" p14:dur="2000"/>
     </mc:Choice>
-    <mc:Fallback>
+    <mc:Fallback xmlns="">
       <p:transition spd="slow"/>
     </mc:Fallback>
   </mc:AlternateContent>
@@ -8423,11 +8423,11 @@
   <p:clrMapOvr>
     <a:masterClrMapping/>
   </p:clrMapOvr>
-  <mc:AlternateContent xmlns:mc="http://schemas.openxmlformats.org/markup-compatibility/2006">
-    <mc:Choice xmlns:p14="http://schemas.microsoft.com/office/powerpoint/2010/main" Requires="p14">
+  <mc:AlternateContent xmlns:mc="http://schemas.openxmlformats.org/markup-compatibility/2006" xmlns:p14="http://schemas.microsoft.com/office/powerpoint/2010/main">
+    <mc:Choice Requires="p14">
       <p:transition spd="slow" p14:dur="2000"/>
     </mc:Choice>
-    <mc:Fallback>
+    <mc:Fallback xmlns="">
       <p:transition spd="slow"/>
     </mc:Fallback>
   </mc:AlternateContent>
@@ -12204,11 +12204,11 @@
   <p:clrMapOvr>
     <a:masterClrMapping/>
   </p:clrMapOvr>
-  <mc:AlternateContent xmlns:mc="http://schemas.openxmlformats.org/markup-compatibility/2006">
-    <mc:Choice xmlns:p14="http://schemas.microsoft.com/office/powerpoint/2010/main" Requires="p14">
+  <mc:AlternateContent xmlns:mc="http://schemas.openxmlformats.org/markup-compatibility/2006" xmlns:p14="http://schemas.microsoft.com/office/powerpoint/2010/main">
+    <mc:Choice Requires="p14">
       <p:transition spd="slow" p14:dur="2000"/>
     </mc:Choice>
-    <mc:Fallback>
+    <mc:Fallback xmlns="">
       <p:transition spd="slow"/>
     </mc:Fallback>
   </mc:AlternateContent>
@@ -16089,11 +16089,11 @@
   <p:clrMapOvr>
     <a:masterClrMapping/>
   </p:clrMapOvr>
-  <mc:AlternateContent xmlns:mc="http://schemas.openxmlformats.org/markup-compatibility/2006">
-    <mc:Choice xmlns:p14="http://schemas.microsoft.com/office/powerpoint/2010/main" Requires="p14">
+  <mc:AlternateContent xmlns:mc="http://schemas.openxmlformats.org/markup-compatibility/2006" xmlns:p14="http://schemas.microsoft.com/office/powerpoint/2010/main">
+    <mc:Choice Requires="p14">
       <p:transition spd="slow" p14:dur="2000"/>
     </mc:Choice>
-    <mc:Fallback>
+    <mc:Fallback xmlns="">
       <p:transition spd="slow"/>
     </mc:Fallback>
   </mc:AlternateContent>
@@ -18176,11 +18176,7 @@
           <a:p>
             <a:r>
               <a:rPr lang="en-US" u="sng" dirty="0" smtClean="0"/>
-              <a:t>Excel </a:t>
-            </a:r>
-            <a:r>
-              <a:rPr lang="en-US" u="sng" dirty="0" smtClean="0"/>
-              <a:t>file</a:t>
+              <a:t>Excel file</a:t>
             </a:r>
             <a:endParaRPr lang="en-US" u="sng" dirty="0"/>
           </a:p>
@@ -19052,11 +19048,7 @@
           <a:p>
             <a:r>
               <a:rPr lang="en-US" u="sng" dirty="0" smtClean="0"/>
-              <a:t>Excel </a:t>
-            </a:r>
-            <a:r>
-              <a:rPr lang="en-US" u="sng" dirty="0" smtClean="0"/>
-              <a:t>Upload Form</a:t>
+              <a:t>Excel Upload Form</a:t>
             </a:r>
             <a:endParaRPr lang="en-US" u="sng" dirty="0"/>
           </a:p>
@@ -19185,11 +19177,7 @@
           <a:p>
             <a:r>
               <a:rPr lang="en-US" sz="2400" u="sng" dirty="0" smtClean="0"/>
-              <a:t>Upload </a:t>
-            </a:r>
-            <a:r>
-              <a:rPr lang="en-US" sz="2400" u="sng" dirty="0" smtClean="0"/>
-              <a:t>Data and Metadata</a:t>
+              <a:t>Upload Data and Metadata</a:t>
             </a:r>
             <a:endParaRPr lang="en-US" sz="2400" u="sng" dirty="0"/>
           </a:p>
@@ -19740,15 +19728,7 @@
                   <a:srgbClr val="FF0000"/>
                 </a:solidFill>
               </a:rPr>
-              <a:t>Metad</a:t>
-            </a:r>
-            <a:r>
-              <a:rPr lang="en-US" dirty="0" smtClean="0">
-                <a:solidFill>
-                  <a:srgbClr val="FF0000"/>
-                </a:solidFill>
-              </a:rPr>
-              <a:t>ata Template</a:t>
+              <a:t>Metadata Template</a:t>
             </a:r>
             <a:endParaRPr lang="en-US" dirty="0">
               <a:solidFill>

</xml_diff>